<commit_message>
Including the final Presentation PPT
</commit_message>
<xml_diff>
--- a/site/documents/Final Presentation/final presentation.pptx
+++ b/site/documents/Final Presentation/final presentation.pptx
@@ -6,14 +6,15 @@
   </p:sldMasterIdLst>
   <p:sldIdLst>
     <p:sldId id="256" r:id="rId2"/>
-    <p:sldId id="257" r:id="rId3"/>
-    <p:sldId id="258" r:id="rId4"/>
-    <p:sldId id="259" r:id="rId5"/>
-    <p:sldId id="260" r:id="rId6"/>
-    <p:sldId id="261" r:id="rId7"/>
-    <p:sldId id="264" r:id="rId8"/>
-    <p:sldId id="262" r:id="rId9"/>
-    <p:sldId id="263" r:id="rId10"/>
+    <p:sldId id="273" r:id="rId3"/>
+    <p:sldId id="274" r:id="rId4"/>
+    <p:sldId id="275" r:id="rId5"/>
+    <p:sldId id="269" r:id="rId6"/>
+    <p:sldId id="270" r:id="rId7"/>
+    <p:sldId id="271" r:id="rId8"/>
+    <p:sldId id="264" r:id="rId9"/>
+    <p:sldId id="265" r:id="rId10"/>
+    <p:sldId id="272" r:id="rId11"/>
   </p:sldIdLst>
   <p:sldSz cx="12192000" cy="6858000"/>
   <p:notesSz cx="6858000" cy="9144000"/>
@@ -5824,6 +5825,12 @@
               <a:rPr lang="en-NZ" dirty="0" smtClean="0"/>
               <a:t>Final presentation</a:t>
             </a:r>
+          </a:p>
+          <a:p>
+            <a:r>
+              <a:rPr lang="en-NZ" smtClean="0"/>
+              <a:t>Team B</a:t>
+            </a:r>
             <a:endParaRPr lang="en-NZ" dirty="0"/>
           </a:p>
         </p:txBody>
@@ -5838,6 +5845,125 @@
   <p:clrMapOvr>
     <a:masterClrMapping/>
   </p:clrMapOvr>
+  <p:timing>
+    <p:tnLst>
+      <p:par>
+        <p:cTn id="1" dur="indefinite" restart="never" nodeType="tmRoot"/>
+      </p:par>
+    </p:tnLst>
+  </p:timing>
+</p:sld>
+</file>
+
+<file path=ppt/slides/slide10.xml><?xml version="1.0" encoding="utf-8"?>
+<p:sld xmlns:a="http://schemas.openxmlformats.org/drawingml/2006/main" xmlns:r="http://schemas.openxmlformats.org/officeDocument/2006/relationships" xmlns:p="http://schemas.openxmlformats.org/presentationml/2006/main">
+  <p:cSld>
+    <p:spTree>
+      <p:nvGrpSpPr>
+        <p:cNvPr id="1" name=""/>
+        <p:cNvGrpSpPr/>
+        <p:nvPr/>
+      </p:nvGrpSpPr>
+      <p:grpSpPr>
+        <a:xfrm>
+          <a:off x="0" y="0"/>
+          <a:ext cx="0" cy="0"/>
+          <a:chOff x="0" y="0"/>
+          <a:chExt cx="0" cy="0"/>
+        </a:xfrm>
+      </p:grpSpPr>
+      <p:sp>
+        <p:nvSpPr>
+          <p:cNvPr id="2" name="Title 1"/>
+          <p:cNvSpPr>
+            <a:spLocks noGrp="1"/>
+          </p:cNvSpPr>
+          <p:nvPr>
+            <p:ph type="title"/>
+          </p:nvPr>
+        </p:nvSpPr>
+        <p:spPr/>
+        <p:txBody>
+          <a:bodyPr/>
+          <a:lstStyle/>
+          <a:p>
+            <a:r>
+              <a:rPr lang="en-NZ" dirty="0" smtClean="0"/>
+              <a:t>LEARNINGS AND TAKE AWAYS</a:t>
+            </a:r>
+            <a:endParaRPr lang="en-NZ" dirty="0"/>
+          </a:p>
+        </p:txBody>
+      </p:sp>
+      <p:sp>
+        <p:nvSpPr>
+          <p:cNvPr id="3" name="Content Placeholder 2"/>
+          <p:cNvSpPr>
+            <a:spLocks noGrp="1"/>
+          </p:cNvSpPr>
+          <p:nvPr>
+            <p:ph idx="1"/>
+          </p:nvPr>
+        </p:nvSpPr>
+        <p:spPr/>
+        <p:txBody>
+          <a:bodyPr/>
+          <a:lstStyle/>
+          <a:p>
+            <a:r>
+              <a:rPr lang="en-NZ" dirty="0" smtClean="0"/>
+              <a:t>To program DB connections solutions and web to DB interconnections in </a:t>
+            </a:r>
+            <a:r>
+              <a:rPr lang="en-NZ" dirty="0" err="1" smtClean="0"/>
+              <a:t>Php</a:t>
+            </a:r>
+            <a:endParaRPr lang="en-NZ" dirty="0"/>
+          </a:p>
+          <a:p>
+            <a:r>
+              <a:rPr lang="en-NZ" dirty="0" smtClean="0"/>
+              <a:t>Programme dynamic page generation for applications such as product displays, shopping cart and  other online applications</a:t>
+            </a:r>
+          </a:p>
+          <a:p>
+            <a:r>
+              <a:rPr lang="en-NZ" dirty="0" smtClean="0"/>
+              <a:t>To analyse the issues in server side programming</a:t>
+            </a:r>
+          </a:p>
+          <a:p>
+            <a:r>
+              <a:rPr lang="en-NZ" dirty="0" smtClean="0"/>
+              <a:t>Design, implement and test small systems that require server side scripting</a:t>
+            </a:r>
+          </a:p>
+          <a:p>
+            <a:r>
+              <a:rPr lang="en-NZ" dirty="0" smtClean="0"/>
+              <a:t>Use supplied classes for functionality such as  DB connection and query</a:t>
+            </a:r>
+            <a:endParaRPr lang="en-NZ" dirty="0"/>
+          </a:p>
+        </p:txBody>
+      </p:sp>
+    </p:spTree>
+    <p:extLst>
+      <p:ext uri="{BB962C8B-B14F-4D97-AF65-F5344CB8AC3E}">
+        <p14:creationId xmlns:p14="http://schemas.microsoft.com/office/powerpoint/2010/main" val="2107359281"/>
+      </p:ext>
+    </p:extLst>
+  </p:cSld>
+  <p:clrMapOvr>
+    <a:masterClrMapping/>
+  </p:clrMapOvr>
+  <p:timing>
+    <p:tnLst>
+      <p:par>
+        <p:cTn id="1" dur="indefinite" restart="never" nodeType="tmRoot"/>
+      </p:par>
+    </p:tnLst>
+  </p:timing>
 </p:sld>
 </file>
 
@@ -5874,9 +6000,16 @@
           <a:lstStyle/>
           <a:p>
             <a:r>
+              <a:rPr lang="en-NZ" sz="4400" dirty="0" smtClean="0"/>
+              <a:t>Quality Assurance</a:t>
+            </a:r>
+            <a:r>
               <a:rPr lang="en-NZ" dirty="0" smtClean="0"/>
-              <a:t>patterns</a:t>
-            </a:r>
+              <a:t/>
+            </a:r>
+            <a:br>
+              <a:rPr lang="en-NZ" dirty="0" smtClean="0"/>
+            </a:br>
             <a:endParaRPr lang="en-NZ" dirty="0"/>
           </a:p>
         </p:txBody>
@@ -5893,40 +6026,47 @@
         </p:nvSpPr>
         <p:spPr/>
         <p:txBody>
-          <a:bodyPr/>
-          <a:lstStyle/>
-          <a:p>
-            <a:pPr marL="0" indent="0">
-              <a:buNone/>
-            </a:pPr>
-            <a:r>
-              <a:rPr lang="en-NZ" dirty="0" smtClean="0"/>
-              <a:t>When talking about models it is impossible to miss the fact that there are patterns. Patterns should be copied and pasted and </a:t>
-            </a:r>
-            <a:r>
-              <a:rPr lang="en-NZ" dirty="0" err="1" smtClean="0"/>
-              <a:t>inhereted</a:t>
-            </a:r>
-            <a:endParaRPr lang="en-NZ" dirty="0" smtClean="0"/>
-          </a:p>
-          <a:p>
-            <a:pPr marL="0" indent="0">
-              <a:buNone/>
-            </a:pPr>
-            <a:endParaRPr lang="en-NZ" dirty="0"/>
+          <a:bodyPr>
+            <a:normAutofit/>
+          </a:bodyPr>
+          <a:lstStyle/>
+          <a:p>
+            <a:r>
+              <a:rPr lang="en-NZ" sz="2800" dirty="0" smtClean="0"/>
+              <a:t>SQL Injection</a:t>
+            </a:r>
+          </a:p>
+          <a:p>
+            <a:r>
+              <a:rPr lang="en-NZ" sz="2800" dirty="0" smtClean="0"/>
+              <a:t>XSS- Cross Site Scripting</a:t>
+            </a:r>
+          </a:p>
+          <a:p>
+            <a:r>
+              <a:rPr lang="en-NZ" sz="2800" dirty="0" smtClean="0"/>
+              <a:t>CSRF- Cross Site Request Forgery</a:t>
+            </a:r>
           </a:p>
         </p:txBody>
       </p:sp>
     </p:spTree>
     <p:extLst>
       <p:ext uri="{BB962C8B-B14F-4D97-AF65-F5344CB8AC3E}">
-        <p14:creationId xmlns:p14="http://schemas.microsoft.com/office/powerpoint/2010/main" val="3411712959"/>
+        <p14:creationId xmlns:p14="http://schemas.microsoft.com/office/powerpoint/2010/main" val="1465456871"/>
       </p:ext>
     </p:extLst>
   </p:cSld>
   <p:clrMapOvr>
     <a:masterClrMapping/>
   </p:clrMapOvr>
+  <p:timing>
+    <p:tnLst>
+      <p:par>
+        <p:cTn id="1" dur="indefinite" restart="never" nodeType="tmRoot"/>
+      </p:par>
+    </p:tnLst>
+  </p:timing>
 </p:sld>
 </file>
 
@@ -5947,84 +6087,47 @@
           <a:chExt cx="0" cy="0"/>
         </a:xfrm>
       </p:grpSpPr>
-      <p:sp>
-        <p:nvSpPr>
-          <p:cNvPr id="2" name="Title 1"/>
-          <p:cNvSpPr>
-            <a:spLocks noGrp="1"/>
-          </p:cNvSpPr>
-          <p:nvPr>
-            <p:ph type="title"/>
-          </p:nvPr>
-        </p:nvSpPr>
-        <p:spPr/>
-        <p:txBody>
-          <a:bodyPr/>
-          <a:lstStyle/>
-          <a:p>
-            <a:r>
-              <a:rPr lang="en-NZ" dirty="0" smtClean="0"/>
-              <a:t>Security</a:t>
-            </a:r>
-            <a:br>
-              <a:rPr lang="en-NZ" dirty="0" smtClean="0"/>
-            </a:br>
-            <a:endParaRPr lang="en-NZ" dirty="0"/>
-          </a:p>
-        </p:txBody>
-      </p:sp>
-      <p:sp>
-        <p:nvSpPr>
-          <p:cNvPr id="3" name="Content Placeholder 2"/>
-          <p:cNvSpPr>
-            <a:spLocks noGrp="1"/>
-          </p:cNvSpPr>
-          <p:nvPr>
-            <p:ph idx="1"/>
-          </p:nvPr>
-        </p:nvSpPr>
-        <p:spPr/>
-        <p:txBody>
-          <a:bodyPr/>
-          <a:lstStyle/>
-          <a:p>
-            <a:r>
-              <a:rPr lang="en-NZ" dirty="0" smtClean="0"/>
-              <a:t>SQL Injection</a:t>
-            </a:r>
-          </a:p>
-          <a:p>
-            <a:r>
-              <a:rPr lang="en-NZ" dirty="0" smtClean="0"/>
-              <a:t>XSS- Cross Site Scripting</a:t>
-            </a:r>
-          </a:p>
-          <a:p>
-            <a:r>
-              <a:rPr lang="en-NZ" dirty="0" smtClean="0"/>
-              <a:t>CSRF- Cross Site Request Forgery</a:t>
-            </a:r>
-            <a:endParaRPr lang="en-NZ" dirty="0"/>
-          </a:p>
-          <a:p>
-            <a:r>
-              <a:rPr lang="en-NZ" dirty="0" smtClean="0"/>
-              <a:t>Cookie stealing</a:t>
-            </a:r>
-            <a:endParaRPr lang="en-NZ" dirty="0"/>
-          </a:p>
-        </p:txBody>
-      </p:sp>
+      <p:pic>
+        <p:nvPicPr>
+          <p:cNvPr id="4" name="Picture 3"/>
+          <p:cNvPicPr>
+            <a:picLocks noChangeAspect="1"/>
+          </p:cNvPicPr>
+          <p:nvPr/>
+        </p:nvPicPr>
+        <p:blipFill>
+          <a:blip r:embed="rId2"/>
+          <a:stretch>
+            <a:fillRect/>
+          </a:stretch>
+        </p:blipFill>
+        <p:spPr>
+          <a:xfrm>
+            <a:off x="2470785" y="1978342"/>
+            <a:ext cx="6153150" cy="1209675"/>
+          </a:xfrm>
+          <a:prstGeom prst="rect">
+            <a:avLst/>
+          </a:prstGeom>
+        </p:spPr>
+      </p:pic>
     </p:spTree>
     <p:extLst>
       <p:ext uri="{BB962C8B-B14F-4D97-AF65-F5344CB8AC3E}">
-        <p14:creationId xmlns:p14="http://schemas.microsoft.com/office/powerpoint/2010/main" val="865020745"/>
+        <p14:creationId xmlns:p14="http://schemas.microsoft.com/office/powerpoint/2010/main" val="4233011374"/>
       </p:ext>
     </p:extLst>
   </p:cSld>
   <p:clrMapOvr>
     <a:masterClrMapping/>
   </p:clrMapOvr>
+  <p:timing>
+    <p:tnLst>
+      <p:par>
+        <p:cTn id="1" dur="indefinite" restart="never" nodeType="tmRoot"/>
+      </p:par>
+    </p:tnLst>
+  </p:timing>
 </p:sld>
 </file>
 
@@ -6083,16 +6186,139 @@
           </a:p>
         </p:txBody>
       </p:sp>
+      <p:pic>
+        <p:nvPicPr>
+          <p:cNvPr id="4" name="Picture 3"/>
+          <p:cNvPicPr>
+            <a:picLocks noChangeAspect="1"/>
+          </p:cNvPicPr>
+          <p:nvPr/>
+        </p:nvPicPr>
+        <p:blipFill>
+          <a:blip r:embed="rId2"/>
+          <a:stretch>
+            <a:fillRect/>
+          </a:stretch>
+        </p:blipFill>
+        <p:spPr>
+          <a:xfrm>
+            <a:off x="948690" y="802005"/>
+            <a:ext cx="4648200" cy="3448050"/>
+          </a:xfrm>
+          <a:prstGeom prst="rect">
+            <a:avLst/>
+          </a:prstGeom>
+        </p:spPr>
+      </p:pic>
+      <p:pic>
+        <p:nvPicPr>
+          <p:cNvPr id="5" name="Picture 4"/>
+          <p:cNvPicPr>
+            <a:picLocks noChangeAspect="1"/>
+          </p:cNvPicPr>
+          <p:nvPr/>
+        </p:nvPicPr>
+        <p:blipFill>
+          <a:blip r:embed="rId3"/>
+          <a:stretch>
+            <a:fillRect/>
+          </a:stretch>
+        </p:blipFill>
+        <p:spPr>
+          <a:xfrm>
+            <a:off x="6135052" y="229552"/>
+            <a:ext cx="5362575" cy="6467475"/>
+          </a:xfrm>
+          <a:prstGeom prst="rect">
+            <a:avLst/>
+          </a:prstGeom>
+        </p:spPr>
+      </p:pic>
     </p:spTree>
     <p:extLst>
       <p:ext uri="{BB962C8B-B14F-4D97-AF65-F5344CB8AC3E}">
-        <p14:creationId xmlns:p14="http://schemas.microsoft.com/office/powerpoint/2010/main" val="232075022"/>
+        <p14:creationId xmlns:p14="http://schemas.microsoft.com/office/powerpoint/2010/main" val="3090907948"/>
       </p:ext>
     </p:extLst>
   </p:cSld>
   <p:clrMapOvr>
     <a:masterClrMapping/>
   </p:clrMapOvr>
+  <p:timing>
+    <p:tnLst>
+      <p:par>
+        <p:cTn id="1" dur="indefinite" restart="never" nodeType="tmRoot">
+          <p:childTnLst>
+            <p:seq concurrent="1" nextAc="seek">
+              <p:cTn id="2" dur="indefinite" nodeType="mainSeq">
+                <p:childTnLst>
+                  <p:par>
+                    <p:cTn id="3" fill="hold">
+                      <p:stCondLst>
+                        <p:cond delay="indefinite"/>
+                      </p:stCondLst>
+                      <p:childTnLst>
+                        <p:par>
+                          <p:cTn id="4" fill="hold">
+                            <p:stCondLst>
+                              <p:cond delay="0"/>
+                            </p:stCondLst>
+                            <p:childTnLst>
+                              <p:par>
+                                <p:cTn id="5" presetID="1" presetClass="entr" presetSubtype="0" fill="hold" nodeType="clickEffect">
+                                  <p:stCondLst>
+                                    <p:cond delay="0"/>
+                                  </p:stCondLst>
+                                  <p:childTnLst>
+                                    <p:set>
+                                      <p:cBhvr>
+                                        <p:cTn id="6" dur="1" fill="hold">
+                                          <p:stCondLst>
+                                            <p:cond delay="0"/>
+                                          </p:stCondLst>
+                                        </p:cTn>
+                                        <p:tgtEl>
+                                          <p:spTgt spid="5"/>
+                                        </p:tgtEl>
+                                        <p:attrNameLst>
+                                          <p:attrName>style.visibility</p:attrName>
+                                        </p:attrNameLst>
+                                      </p:cBhvr>
+                                      <p:to>
+                                        <p:strVal val="visible"/>
+                                      </p:to>
+                                    </p:set>
+                                  </p:childTnLst>
+                                </p:cTn>
+                              </p:par>
+                            </p:childTnLst>
+                          </p:cTn>
+                        </p:par>
+                      </p:childTnLst>
+                    </p:cTn>
+                  </p:par>
+                </p:childTnLst>
+              </p:cTn>
+              <p:prevCondLst>
+                <p:cond evt="onPrev" delay="0">
+                  <p:tgtEl>
+                    <p:sldTgt/>
+                  </p:tgtEl>
+                </p:cond>
+              </p:prevCondLst>
+              <p:nextCondLst>
+                <p:cond evt="onNext" delay="0">
+                  <p:tgtEl>
+                    <p:sldTgt/>
+                  </p:tgtEl>
+                </p:cond>
+              </p:nextCondLst>
+            </p:seq>
+          </p:childTnLst>
+        </p:cTn>
+      </p:par>
+    </p:tnLst>
+  </p:timing>
 </p:sld>
 </file>
 
@@ -6129,10 +6355,10 @@
           <a:lstStyle/>
           <a:p>
             <a:r>
-              <a:rPr lang="en-NZ" dirty="0" err="1" smtClean="0"/>
-              <a:t>Mvc</a:t>
-            </a:r>
-            <a:endParaRPr lang="en-NZ" dirty="0"/>
+              <a:rPr lang="en-IN" dirty="0" smtClean="0"/>
+              <a:t>Architecture</a:t>
+            </a:r>
+            <a:endParaRPr lang="en-IN" dirty="0"/>
           </a:p>
         </p:txBody>
       </p:sp>
@@ -6151,100 +6377,91 @@
           <a:bodyPr/>
           <a:lstStyle/>
           <a:p>
-            <a:pPr marL="0" indent="0">
-              <a:buNone/>
-            </a:pPr>
-            <a:r>
-              <a:rPr lang="en-NZ" dirty="0" smtClean="0"/>
-              <a:t>What have we learned about it </a:t>
-            </a:r>
-          </a:p>
-          <a:p>
-            <a:pPr marL="0" indent="0">
-              <a:buNone/>
-            </a:pPr>
-            <a:endParaRPr lang="en-NZ" dirty="0" smtClean="0"/>
-          </a:p>
-          <a:p>
-            <a:pPr marL="342900" indent="-342900">
-              <a:buFont typeface="+mj-lt"/>
-              <a:buAutoNum type="arabicPeriod"/>
-            </a:pPr>
-            <a:r>
-              <a:rPr lang="en-NZ" dirty="0" smtClean="0"/>
-              <a:t>Models</a:t>
-            </a:r>
-          </a:p>
-          <a:p>
-            <a:pPr marL="342900" indent="-342900">
-              <a:buFont typeface="+mj-lt"/>
-              <a:buAutoNum type="arabicPeriod"/>
-            </a:pPr>
-            <a:r>
-              <a:rPr lang="en-NZ" dirty="0" smtClean="0"/>
-              <a:t>View</a:t>
-            </a:r>
-          </a:p>
-          <a:p>
-            <a:pPr marL="342900" indent="-342900">
-              <a:buFont typeface="+mj-lt"/>
-              <a:buAutoNum type="arabicPeriod"/>
-            </a:pPr>
-            <a:r>
-              <a:rPr lang="en-NZ" dirty="0" err="1" smtClean="0"/>
-              <a:t>Controlller</a:t>
-            </a:r>
-            <a:endParaRPr lang="en-NZ" dirty="0" smtClean="0"/>
-          </a:p>
-          <a:p>
-            <a:pPr marL="342900" indent="-342900">
-              <a:buFont typeface="+mj-lt"/>
-              <a:buAutoNum type="arabicPeriod"/>
-            </a:pPr>
-            <a:endParaRPr lang="en-NZ" dirty="0" smtClean="0"/>
-          </a:p>
-          <a:p>
-            <a:pPr marL="0" indent="0">
-              <a:buNone/>
-            </a:pPr>
-            <a:endParaRPr lang="en-NZ" dirty="0"/>
-          </a:p>
-          <a:p>
-            <a:pPr marL="0" indent="0">
-              <a:buNone/>
-            </a:pPr>
-            <a:endParaRPr lang="en-NZ" dirty="0" smtClean="0"/>
-          </a:p>
-          <a:p>
-            <a:pPr marL="0" indent="0">
-              <a:buNone/>
-            </a:pPr>
-            <a:endParaRPr lang="en-NZ" dirty="0"/>
-          </a:p>
-          <a:p>
-            <a:pPr marL="0" indent="0">
-              <a:buNone/>
-            </a:pPr>
-            <a:endParaRPr lang="en-NZ" dirty="0" smtClean="0"/>
-          </a:p>
-          <a:p>
-            <a:pPr marL="0" indent="0">
-              <a:buNone/>
-            </a:pPr>
-            <a:endParaRPr lang="en-NZ" dirty="0"/>
-          </a:p>
-        </p:txBody>
-      </p:sp>
+            <a:endParaRPr lang="en-IN" dirty="0"/>
+          </a:p>
+        </p:txBody>
+      </p:sp>
+      <p:pic>
+        <p:nvPicPr>
+          <p:cNvPr id="1026" name="Picture 2"/>
+          <p:cNvPicPr>
+            <a:picLocks noChangeAspect="1" noChangeArrowheads="1"/>
+          </p:cNvPicPr>
+          <p:nvPr/>
+        </p:nvPicPr>
+        <p:blipFill>
+          <a:blip r:embed="rId2">
+            <a:extLst>
+              <a:ext uri="{28A0092B-C50C-407E-A947-70E740481C1C}">
+                <a14:useLocalDpi xmlns:a14="http://schemas.microsoft.com/office/drawing/2010/main" val="0"/>
+              </a:ext>
+            </a:extLst>
+          </a:blip>
+          <a:srcRect/>
+          <a:stretch>
+            <a:fillRect/>
+          </a:stretch>
+        </p:blipFill>
+        <p:spPr bwMode="auto">
+          <a:xfrm>
+            <a:off x="2897753" y="1930826"/>
+            <a:ext cx="6185816" cy="4364499"/>
+          </a:xfrm>
+          <a:prstGeom prst="rect">
+            <a:avLst/>
+          </a:prstGeom>
+          <a:noFill/>
+          <a:ln>
+            <a:noFill/>
+          </a:ln>
+          <a:effectLst/>
+          <a:extLst>
+            <a:ext uri="{909E8E84-426E-40DD-AFC4-6F175D3DCCD1}">
+              <a14:hiddenFill xmlns:a14="http://schemas.microsoft.com/office/drawing/2010/main">
+                <a:solidFill>
+                  <a:schemeClr val="accent1"/>
+                </a:solidFill>
+              </a14:hiddenFill>
+            </a:ext>
+            <a:ext uri="{91240B29-F687-4F45-9708-019B960494DF}">
+              <a14:hiddenLine xmlns:a14="http://schemas.microsoft.com/office/drawing/2010/main" w="9525">
+                <a:solidFill>
+                  <a:schemeClr val="tx1"/>
+                </a:solidFill>
+                <a:miter lim="800000"/>
+                <a:headEnd/>
+                <a:tailEnd/>
+              </a14:hiddenLine>
+            </a:ext>
+            <a:ext uri="{AF507438-7753-43E0-B8FC-AC1667EBCBE1}">
+              <a14:hiddenEffects xmlns:a14="http://schemas.microsoft.com/office/drawing/2010/main">
+                <a:effectLst>
+                  <a:outerShdw dist="35921" dir="2700000" algn="ctr" rotWithShape="0">
+                    <a:schemeClr val="bg2"/>
+                  </a:outerShdw>
+                </a:effectLst>
+              </a14:hiddenEffects>
+            </a:ext>
+          </a:extLst>
+        </p:spPr>
+      </p:pic>
     </p:spTree>
     <p:extLst>
       <p:ext uri="{BB962C8B-B14F-4D97-AF65-F5344CB8AC3E}">
-        <p14:creationId xmlns:p14="http://schemas.microsoft.com/office/powerpoint/2010/main" val="1375492208"/>
+        <p14:creationId xmlns:p14="http://schemas.microsoft.com/office/powerpoint/2010/main" val="3926140715"/>
       </p:ext>
     </p:extLst>
   </p:cSld>
   <p:clrMapOvr>
     <a:masterClrMapping/>
   </p:clrMapOvr>
+  <p:timing>
+    <p:tnLst>
+      <p:par>
+        <p:cTn id="1" dur="indefinite" restart="never" nodeType="tmRoot"/>
+      </p:par>
+    </p:tnLst>
+  </p:timing>
 </p:sld>
 </file>
 
@@ -6300,100 +6517,132 @@
         </p:nvSpPr>
         <p:spPr/>
         <p:txBody>
-          <a:bodyPr/>
-          <a:lstStyle/>
-          <a:p>
-            <a:r>
-              <a:rPr lang="en-NZ" dirty="0" smtClean="0"/>
+          <a:bodyPr>
+            <a:normAutofit/>
+          </a:bodyPr>
+          <a:lstStyle/>
+          <a:p>
+            <a:pPr marL="0" indent="0">
+              <a:buNone/>
+            </a:pPr>
+            <a:r>
+              <a:rPr lang="en-NZ" sz="2800" b="1" dirty="0" smtClean="0"/>
               <a:t>Separation Of Concerns(SOC)</a:t>
             </a:r>
           </a:p>
           <a:p>
-            <a:r>
-              <a:rPr lang="en-NZ" dirty="0" smtClean="0"/>
-              <a:t>SOLID</a:t>
-            </a:r>
-          </a:p>
-          <a:p>
             <a:pPr marL="0" indent="0">
               <a:buNone/>
             </a:pPr>
             <a:r>
-              <a:rPr lang="en-NZ" dirty="0" smtClean="0"/>
-              <a:t>	S-single responsibility</a:t>
-            </a:r>
+              <a:rPr lang="en-IN" dirty="0"/>
+              <a:t>Separation of Model, View, and Controller:</a:t>
+            </a:r>
+          </a:p>
+          <a:p>
+            <a:r>
+              <a:rPr lang="en-IN" dirty="0" smtClean="0"/>
+              <a:t>allows </a:t>
+            </a:r>
+            <a:r>
+              <a:rPr lang="en-IN" dirty="0"/>
+              <a:t>re-use of business-logic across </a:t>
+            </a:r>
+            <a:r>
+              <a:rPr lang="en-IN" dirty="0" smtClean="0"/>
+              <a:t>applications</a:t>
+            </a:r>
+          </a:p>
+          <a:p>
+            <a:r>
+              <a:rPr lang="en-IN" dirty="0" smtClean="0"/>
+              <a:t>allows </a:t>
+            </a:r>
+            <a:r>
+              <a:rPr lang="en-IN" dirty="0"/>
+              <a:t>development of multiple UIs without touching business logic </a:t>
+            </a:r>
+            <a:r>
+              <a:rPr lang="en-IN" dirty="0" smtClean="0"/>
+              <a:t>codebase</a:t>
+            </a:r>
+          </a:p>
+          <a:p>
+            <a:r>
+              <a:rPr lang="en-IN" dirty="0" smtClean="0"/>
+              <a:t>discourages </a:t>
+            </a:r>
+            <a:r>
+              <a:rPr lang="en-IN" dirty="0"/>
+              <a:t>"cut-&amp;-paste" repetition of code, streamlining upgrade &amp; </a:t>
+            </a:r>
+            <a:r>
+              <a:rPr lang="en-IN" dirty="0" smtClean="0"/>
+              <a:t>maintenance tasks</a:t>
+            </a:r>
+            <a:endParaRPr lang="en-IN" dirty="0"/>
           </a:p>
           <a:p>
             <a:pPr marL="0" indent="0">
               <a:buNone/>
             </a:pPr>
             <a:r>
-              <a:rPr lang="en-NZ" dirty="0" smtClean="0"/>
-              <a:t>	O-open-closed principle</a:t>
-            </a:r>
-          </a:p>
-          <a:p>
-            <a:pPr marL="0" indent="0">
-              <a:buNone/>
-            </a:pPr>
-            <a:r>
-              <a:rPr lang="en-NZ" dirty="0" smtClean="0"/>
-              <a:t>	L-</a:t>
-            </a:r>
-            <a:r>
-              <a:rPr lang="en-NZ" dirty="0" err="1" smtClean="0"/>
-              <a:t>Liskov</a:t>
-            </a:r>
-            <a:r>
-              <a:rPr lang="en-NZ" dirty="0" smtClean="0"/>
-              <a:t> substitution</a:t>
-            </a:r>
-          </a:p>
-          <a:p>
-            <a:pPr marL="0" indent="0">
-              <a:buNone/>
-            </a:pPr>
-            <a:r>
-              <a:rPr lang="en-NZ" dirty="0" smtClean="0"/>
-              <a:t>	I- Interface Segregation</a:t>
-            </a:r>
-          </a:p>
-          <a:p>
-            <a:pPr marL="0" indent="0">
-              <a:buNone/>
-            </a:pPr>
-            <a:r>
-              <a:rPr lang="en-NZ" dirty="0" smtClean="0"/>
-              <a:t>	D-Dependency Inversion</a:t>
-            </a:r>
-          </a:p>
-          <a:p>
-            <a:pPr marL="0" indent="0">
-              <a:buNone/>
-            </a:pPr>
-            <a:r>
-              <a:rPr lang="en-NZ" dirty="0" smtClean="0"/>
-              <a:t>	DRY- Don’t Repeat Yourself</a:t>
-            </a:r>
-          </a:p>
-          <a:p>
-            <a:pPr marL="0" indent="0">
-              <a:buNone/>
-            </a:pPr>
-            <a:endParaRPr lang="en-NZ" dirty="0"/>
+              <a:rPr lang="en-IN" dirty="0"/>
+              <a:t>Looking at the other side of the same coin, intermingling M, V, and C code makes for</a:t>
+            </a:r>
+            <a:r>
+              <a:rPr lang="en-IN" dirty="0" smtClean="0"/>
+              <a:t>:</a:t>
+            </a:r>
+          </a:p>
+          <a:p>
+            <a:r>
+              <a:rPr lang="en-IN" dirty="0" smtClean="0"/>
+              <a:t>bigger</a:t>
+            </a:r>
+            <a:r>
+              <a:rPr lang="en-IN" dirty="0"/>
+              <a:t>, </a:t>
+            </a:r>
+            <a:r>
+              <a:rPr lang="en-IN" dirty="0" smtClean="0"/>
+              <a:t>harder-to-maintain classes</a:t>
+            </a:r>
+          </a:p>
+          <a:p>
+            <a:r>
+              <a:rPr lang="en-IN" dirty="0" smtClean="0"/>
+              <a:t>repetition </a:t>
+            </a:r>
+            <a:r>
+              <a:rPr lang="en-IN" dirty="0"/>
+              <a:t>of code in multiple classes (upgrade &amp; maintenance issues</a:t>
+            </a:r>
+            <a:r>
+              <a:rPr lang="en-IN" dirty="0" smtClean="0"/>
+              <a:t>)</a:t>
+            </a:r>
+            <a:endParaRPr lang="en-NZ" dirty="0" smtClean="0"/>
           </a:p>
         </p:txBody>
       </p:sp>
     </p:spTree>
     <p:extLst>
       <p:ext uri="{BB962C8B-B14F-4D97-AF65-F5344CB8AC3E}">
-        <p14:creationId xmlns:p14="http://schemas.microsoft.com/office/powerpoint/2010/main" val="4066120540"/>
+        <p14:creationId xmlns:p14="http://schemas.microsoft.com/office/powerpoint/2010/main" val="3539131246"/>
       </p:ext>
     </p:extLst>
   </p:cSld>
   <p:clrMapOvr>
     <a:masterClrMapping/>
   </p:clrMapOvr>
+  <p:timing>
+    <p:tnLst>
+      <p:par>
+        <p:cTn id="1" dur="indefinite" restart="never" nodeType="tmRoot"/>
+      </p:par>
+    </p:tnLst>
+  </p:timing>
 </p:sld>
 </file>
 
@@ -6429,11 +6678,7 @@
           <a:bodyPr/>
           <a:lstStyle/>
           <a:p>
-            <a:r>
-              <a:rPr lang="en-NZ" dirty="0" smtClean="0"/>
-              <a:t>SOLID principles</a:t>
-            </a:r>
-            <a:endParaRPr lang="en-NZ" dirty="0"/>
+            <a:endParaRPr lang="en-IN" dirty="0"/>
           </a:p>
         </p:txBody>
       </p:sp>
@@ -6447,61 +6692,93 @@
             <p:ph idx="1"/>
           </p:nvPr>
         </p:nvSpPr>
-        <p:spPr/>
-        <p:txBody>
-          <a:bodyPr/>
-          <a:lstStyle/>
-          <a:p>
-            <a:r>
-              <a:rPr lang="en-NZ" dirty="0" smtClean="0"/>
-              <a:t>Single responsibility- Every object in a class should have a single responsibility, and that should be encapsulated by that class</a:t>
-            </a:r>
-          </a:p>
-          <a:p>
-            <a:r>
-              <a:rPr lang="en-NZ" dirty="0" smtClean="0"/>
-              <a:t>Open/closed responsibility- Open for extension ,but closed for modification</a:t>
-            </a:r>
-          </a:p>
-          <a:p>
-            <a:r>
-              <a:rPr lang="en-NZ" dirty="0" err="1" smtClean="0"/>
-              <a:t>Liskov</a:t>
-            </a:r>
-            <a:r>
-              <a:rPr lang="en-NZ" dirty="0" smtClean="0"/>
-              <a:t> substitution – Objects in a program should be replaceable with the instances of the subclasses without altering the correctness of the program</a:t>
-            </a:r>
-          </a:p>
-          <a:p>
-            <a:r>
-              <a:rPr lang="en-NZ" dirty="0" smtClean="0"/>
-              <a:t>Interface segregation- multiple specific interfaces are better than one general purpose interface</a:t>
-            </a:r>
-          </a:p>
-          <a:p>
-            <a:r>
-              <a:rPr lang="en-NZ" dirty="0" smtClean="0"/>
-              <a:t>Dependency Inversion- Depends on abstractions and not </a:t>
-            </a:r>
-            <a:r>
-              <a:rPr lang="en-NZ" smtClean="0"/>
-              <a:t>on concretions.</a:t>
-            </a:r>
-            <a:endParaRPr lang="en-NZ" dirty="0"/>
+        <p:spPr>
+          <a:xfrm>
+            <a:off x="685801" y="2154946"/>
+            <a:ext cx="10131425" cy="3717819"/>
+          </a:xfrm>
+        </p:spPr>
+        <p:txBody>
+          <a:bodyPr>
+            <a:normAutofit fontScale="92500"/>
+          </a:bodyPr>
+          <a:lstStyle/>
+          <a:p>
+            <a:pPr marL="0" indent="0">
+              <a:buNone/>
+            </a:pPr>
+            <a:r>
+              <a:rPr lang="en-IN" sz="3200" b="1" dirty="0" smtClean="0"/>
+              <a:t>DRY (</a:t>
+            </a:r>
+            <a:r>
+              <a:rPr lang="en-IN" sz="3200" b="1" dirty="0"/>
+              <a:t>Don't repeat </a:t>
+            </a:r>
+            <a:r>
+              <a:rPr lang="en-IN" sz="3200" b="1" dirty="0" smtClean="0"/>
+              <a:t>yourself)</a:t>
+            </a:r>
+          </a:p>
+          <a:p>
+            <a:pPr marL="0" indent="0">
+              <a:buNone/>
+            </a:pPr>
+            <a:endParaRPr lang="en-IN" dirty="0" smtClean="0"/>
+          </a:p>
+          <a:p>
+            <a:pPr marL="0" indent="0" algn="just">
+              <a:buNone/>
+            </a:pPr>
+            <a:r>
+              <a:rPr lang="en-IN" sz="2400" dirty="0" smtClean="0"/>
+              <a:t>The </a:t>
+            </a:r>
+            <a:r>
+              <a:rPr lang="en-IN" sz="2400" dirty="0"/>
+              <a:t>DRY principle is stated as “Every piece of knowledge must have a single, unambiguous, authoritative representation within a system</a:t>
+            </a:r>
+            <a:r>
+              <a:rPr lang="en-IN" sz="2400" dirty="0" smtClean="0"/>
+              <a:t>.”</a:t>
+            </a:r>
+          </a:p>
+          <a:p>
+            <a:pPr marL="0" indent="0" algn="just">
+              <a:buNone/>
+            </a:pPr>
+            <a:r>
+              <a:rPr lang="en-IN" sz="2400" dirty="0"/>
+              <a:t> </a:t>
+            </a:r>
+            <a:r>
+              <a:rPr lang="en-IN" sz="2400" dirty="0" smtClean="0"/>
+              <a:t>In</a:t>
+            </a:r>
+            <a:r>
+              <a:rPr lang="en-IN" sz="2400" dirty="0"/>
+              <a:t> model-driven architectures, in which software artifacts are derived from a central object model expressed in a form such as UML. DRY code is created by data transformation and code generators, which allows the software developer to avoid copy and paste operations. DRY code usually makes large software systems easier to maintain, as long as the data transformations are easy to create and maintain.</a:t>
+            </a:r>
           </a:p>
         </p:txBody>
       </p:sp>
     </p:spTree>
     <p:extLst>
       <p:ext uri="{BB962C8B-B14F-4D97-AF65-F5344CB8AC3E}">
-        <p14:creationId xmlns:p14="http://schemas.microsoft.com/office/powerpoint/2010/main" val="4224891287"/>
+        <p14:creationId xmlns:p14="http://schemas.microsoft.com/office/powerpoint/2010/main" val="2118539711"/>
       </p:ext>
     </p:extLst>
   </p:cSld>
   <p:clrMapOvr>
     <a:masterClrMapping/>
   </p:clrMapOvr>
+  <p:timing>
+    <p:tnLst>
+      <p:par>
+        <p:cTn id="1" dur="indefinite" restart="never" nodeType="tmRoot"/>
+      </p:par>
+    </p:tnLst>
+  </p:timing>
 </p:sld>
 </file>
 
@@ -6539,7 +6816,7 @@
           <a:p>
             <a:r>
               <a:rPr lang="en-NZ" dirty="0" smtClean="0"/>
-              <a:t>Project experience</a:t>
+              <a:t>SOLID principles</a:t>
             </a:r>
             <a:endParaRPr lang="en-NZ" dirty="0"/>
           </a:p>
@@ -6560,6 +6837,42 @@
           <a:bodyPr/>
           <a:lstStyle/>
           <a:p>
+            <a:r>
+              <a:rPr lang="en-NZ" dirty="0" smtClean="0"/>
+              <a:t>Single responsibility- Every object in a class should have a single responsibility, and that should be encapsulated by that class</a:t>
+            </a:r>
+          </a:p>
+          <a:p>
+            <a:r>
+              <a:rPr lang="en-NZ" dirty="0" smtClean="0"/>
+              <a:t>Open/closed responsibility- Open for extension ,but closed for modification</a:t>
+            </a:r>
+          </a:p>
+          <a:p>
+            <a:r>
+              <a:rPr lang="en-NZ" dirty="0" err="1" smtClean="0"/>
+              <a:t>Liskov</a:t>
+            </a:r>
+            <a:r>
+              <a:rPr lang="en-NZ" dirty="0" smtClean="0"/>
+              <a:t> substitution – Objects in a program should be replaceable with the instances of the subclasses without altering the correctness of the program</a:t>
+            </a:r>
+          </a:p>
+          <a:p>
+            <a:r>
+              <a:rPr lang="en-NZ" dirty="0" smtClean="0"/>
+              <a:t>Interface segregation- multiple specific interfaces are better than one general purpose interface</a:t>
+            </a:r>
+          </a:p>
+          <a:p>
+            <a:r>
+              <a:rPr lang="en-NZ" dirty="0" smtClean="0"/>
+              <a:t>Dependency Inversion- Depends on abstractions and not </a:t>
+            </a:r>
+            <a:r>
+              <a:rPr lang="en-NZ" smtClean="0"/>
+              <a:t>on concretions.</a:t>
+            </a:r>
             <a:endParaRPr lang="en-NZ" dirty="0"/>
           </a:p>
         </p:txBody>
@@ -6567,13 +6880,20 @@
     </p:spTree>
     <p:extLst>
       <p:ext uri="{BB962C8B-B14F-4D97-AF65-F5344CB8AC3E}">
-        <p14:creationId xmlns:p14="http://schemas.microsoft.com/office/powerpoint/2010/main" val="1680240970"/>
+        <p14:creationId xmlns:p14="http://schemas.microsoft.com/office/powerpoint/2010/main" val="4224891287"/>
       </p:ext>
     </p:extLst>
   </p:cSld>
   <p:clrMapOvr>
     <a:masterClrMapping/>
   </p:clrMapOvr>
+  <p:timing>
+    <p:tnLst>
+      <p:par>
+        <p:cTn id="1" dur="indefinite" restart="never" nodeType="tmRoot"/>
+      </p:par>
+    </p:tnLst>
+  </p:timing>
 </p:sld>
 </file>
 
@@ -6611,7 +6931,7 @@
           <a:p>
             <a:r>
               <a:rPr lang="en-NZ" dirty="0" smtClean="0"/>
-              <a:t>LEARNINGS AND TAKE AWAYS</a:t>
+              <a:t>Project experience</a:t>
             </a:r>
             <a:endParaRPr lang="en-NZ" dirty="0"/>
           </a:p>
@@ -6627,58 +6947,78 @@
             <p:ph idx="1"/>
           </p:nvPr>
         </p:nvSpPr>
-        <p:spPr/>
-        <p:txBody>
-          <a:bodyPr/>
-          <a:lstStyle/>
-          <a:p>
-            <a:r>
-              <a:rPr lang="en-NZ" dirty="0" smtClean="0"/>
-              <a:t>To program DB connections solutions and web to DB interconnections in </a:t>
-            </a:r>
-            <a:r>
-              <a:rPr lang="en-NZ" dirty="0" err="1" smtClean="0"/>
-              <a:t>Php</a:t>
-            </a:r>
-            <a:endParaRPr lang="en-NZ" dirty="0"/>
-          </a:p>
-          <a:p>
-            <a:r>
-              <a:rPr lang="en-NZ" dirty="0" smtClean="0"/>
-              <a:t>Programme dynamic page generation for applications such as product displays, shopping cart and  other online applications</a:t>
-            </a:r>
-          </a:p>
-          <a:p>
-            <a:r>
-              <a:rPr lang="en-NZ" dirty="0" smtClean="0"/>
-              <a:t>To analyse the issues in server side programming</a:t>
-            </a:r>
-          </a:p>
-          <a:p>
-            <a:r>
-              <a:rPr lang="en-NZ" dirty="0" smtClean="0"/>
-              <a:t>Design, implement and test small systems that require server side scripting</a:t>
-            </a:r>
-          </a:p>
-          <a:p>
-            <a:r>
-              <a:rPr lang="en-NZ" dirty="0" smtClean="0"/>
-              <a:t>Use supplied classes for functionality such as  DB connection and query</a:t>
-            </a:r>
-            <a:endParaRPr lang="en-NZ" dirty="0"/>
+        <p:spPr>
+          <a:xfrm>
+            <a:off x="685801" y="2065867"/>
+            <a:ext cx="10131425" cy="3649133"/>
+          </a:xfrm>
+        </p:spPr>
+        <p:txBody>
+          <a:bodyPr>
+            <a:normAutofit/>
+          </a:bodyPr>
+          <a:lstStyle/>
+          <a:p>
+            <a:r>
+              <a:rPr lang="en-NZ" sz="3500" dirty="0" smtClean="0"/>
+              <a:t>Scrum.</a:t>
+            </a:r>
+            <a:endParaRPr lang="en-NZ" sz="3500" dirty="0"/>
+          </a:p>
+          <a:p>
+            <a:r>
+              <a:rPr lang="en-NZ" sz="3500" dirty="0" err="1" smtClean="0"/>
+              <a:t>Github</a:t>
+            </a:r>
+            <a:r>
+              <a:rPr lang="en-NZ" sz="3500" dirty="0" smtClean="0"/>
+              <a:t>.</a:t>
+            </a:r>
+          </a:p>
+          <a:p>
+            <a:r>
+              <a:rPr lang="en-NZ" sz="3500" smtClean="0"/>
+              <a:t>Moodle.</a:t>
+            </a:r>
+            <a:endParaRPr lang="en-NZ" sz="3500" dirty="0"/>
+          </a:p>
+          <a:p>
+            <a:r>
+              <a:rPr lang="en-NZ" sz="3500" dirty="0" smtClean="0"/>
+              <a:t>Google drive.</a:t>
+            </a:r>
+          </a:p>
+          <a:p>
+            <a:r>
+              <a:rPr lang="en-NZ" sz="3500" dirty="0" smtClean="0"/>
+              <a:t>Blended Learning.</a:t>
+            </a:r>
+          </a:p>
+          <a:p>
+            <a:endParaRPr lang="en-NZ" sz="3500" dirty="0" smtClean="0"/>
+          </a:p>
+          <a:p>
+            <a:endParaRPr lang="en-NZ" sz="3500" dirty="0"/>
           </a:p>
         </p:txBody>
       </p:sp>
     </p:spTree>
     <p:extLst>
       <p:ext uri="{BB962C8B-B14F-4D97-AF65-F5344CB8AC3E}">
-        <p14:creationId xmlns:p14="http://schemas.microsoft.com/office/powerpoint/2010/main" val="903807188"/>
+        <p14:creationId xmlns:p14="http://schemas.microsoft.com/office/powerpoint/2010/main" val="1219117145"/>
       </p:ext>
     </p:extLst>
   </p:cSld>
   <p:clrMapOvr>
     <a:masterClrMapping/>
   </p:clrMapOvr>
+  <p:timing>
+    <p:tnLst>
+      <p:par>
+        <p:cTn id="1" dur="indefinite" restart="never" nodeType="tmRoot"/>
+      </p:par>
+    </p:tnLst>
+  </p:timing>
 </p:sld>
 </file>
 

</xml_diff>